<commit_message>
Update Ex 2 slide deck
</commit_message>
<xml_diff>
--- a/02-fabricreact.pptx
+++ b/02-fabricreact.pptx
@@ -5,10 +5,10 @@
     <p:sldMasterId id="2147484229" r:id="rId2"/>
   </p:sldMasterIdLst>
   <p:notesMasterIdLst>
-    <p:notesMasterId r:id="rId32"/>
+    <p:notesMasterId r:id="rId31"/>
   </p:notesMasterIdLst>
   <p:handoutMasterIdLst>
-    <p:handoutMasterId r:id="rId33"/>
+    <p:handoutMasterId r:id="rId32"/>
   </p:handoutMasterIdLst>
   <p:sldIdLst>
     <p:sldId id="1562" r:id="rId3"/>
@@ -33,13 +33,12 @@
     <p:sldId id="1572" r:id="rId22"/>
     <p:sldId id="1573" r:id="rId23"/>
     <p:sldId id="1574" r:id="rId24"/>
-    <p:sldId id="1592" r:id="rId25"/>
-    <p:sldId id="1593" r:id="rId26"/>
-    <p:sldId id="1589" r:id="rId27"/>
-    <p:sldId id="1577" r:id="rId28"/>
-    <p:sldId id="1578" r:id="rId29"/>
-    <p:sldId id="1579" r:id="rId30"/>
-    <p:sldId id="1580" r:id="rId31"/>
+    <p:sldId id="1593" r:id="rId25"/>
+    <p:sldId id="1589" r:id="rId26"/>
+    <p:sldId id="1577" r:id="rId27"/>
+    <p:sldId id="1578" r:id="rId28"/>
+    <p:sldId id="1579" r:id="rId29"/>
+    <p:sldId id="1580" r:id="rId30"/>
   </p:sldIdLst>
   <p:sldSz cx="12436475" cy="6994525"/>
   <p:notesSz cx="6858000" cy="9144000"/>
@@ -169,7 +168,6 @@
             <p14:sldId id="1572"/>
             <p14:sldId id="1573"/>
             <p14:sldId id="1574"/>
-            <p14:sldId id="1592"/>
             <p14:sldId id="1593"/>
             <p14:sldId id="1589"/>
           </p14:sldIdLst>
@@ -2796,7 +2794,7 @@
               <a:rPr lang="en-US" smtClean="0">
                 <a:latin typeface="Segoe UI" pitchFamily="34" charset="0"/>
               </a:rPr>
-              <a:t>3/14/19 5:07 PM</a:t>
+              <a:t>9/1/2019 3:44 PM</a:t>
             </a:fld>
             <a:endParaRPr lang="en-US" dirty="0">
               <a:latin typeface="Segoe UI" pitchFamily="34" charset="0"/>
@@ -3093,7 +3091,7 @@
           <a:p>
             <a:fld id="{D18B56EA-E28F-4F92-9F16-7A6F2501B303}" type="datetime8">
               <a:rPr lang="en-US" smtClean="0"/>
-              <a:t>3/14/19 5:07 PM</a:t>
+              <a:t>9/1/2019 3:44 PM</a:t>
             </a:fld>
             <a:endParaRPr lang="en-US" dirty="0"/>
           </a:p>
@@ -3476,7 +3474,7 @@
           <a:p>
             <a:fld id="{D18B56EA-E28F-4F92-9F16-7A6F2501B303}" type="datetime8">
               <a:rPr lang="en-US" smtClean="0"/>
-              <a:t>3/14/19 6:11 PM</a:t>
+              <a:t>9/1/2019 3:44 PM</a:t>
             </a:fld>
             <a:endParaRPr lang="en-US" dirty="0"/>
           </a:p>
@@ -3657,7 +3655,7 @@
           <a:p>
             <a:fld id="{D18B56EA-E28F-4F92-9F16-7A6F2501B303}" type="datetime8">
               <a:rPr lang="en-US" smtClean="0"/>
-              <a:t>3/14/19 6:10 PM</a:t>
+              <a:t>9/1/2019 3:44 PM</a:t>
             </a:fld>
             <a:endParaRPr lang="en-US" dirty="0"/>
           </a:p>
@@ -3854,7 +3852,7 @@
           <a:p>
             <a:fld id="{90EC29EE-A8AD-4CE0-9C0B-116E0D4D7533}" type="datetime8">
               <a:rPr lang="en-US" smtClean="0"/>
-              <a:t>3/14/19 6:08 PM</a:t>
+              <a:t>9/1/2019 3:44 PM</a:t>
             </a:fld>
             <a:endParaRPr lang="en-US" dirty="0"/>
           </a:p>
@@ -4035,7 +4033,7 @@
           <a:p>
             <a:fld id="{D18B56EA-E28F-4F92-9F16-7A6F2501B303}" type="datetime8">
               <a:rPr lang="en-US" smtClean="0"/>
-              <a:t>3/14/19 5:07 PM</a:t>
+              <a:t>9/1/2019 3:44 PM</a:t>
             </a:fld>
             <a:endParaRPr lang="en-US" dirty="0"/>
           </a:p>
@@ -4059,7 +4057,7 @@
             <a:fld id="{B4008EB6-D09E-4580-8CD6-DDB14511944F}" type="slidenum">
               <a:rPr lang="en-US" smtClean="0"/>
               <a:pPr/>
-              <a:t>25</a:t>
+              <a:t>24</a:t>
             </a:fld>
             <a:endParaRPr lang="en-US" dirty="0"/>
           </a:p>
@@ -4216,7 +4214,7 @@
           <a:p>
             <a:fld id="{D18B56EA-E28F-4F92-9F16-7A6F2501B303}" type="datetime8">
               <a:rPr lang="en-US" smtClean="0"/>
-              <a:t>3/14/19 6:18 PM</a:t>
+              <a:t>9/1/2019 3:44 PM</a:t>
             </a:fld>
             <a:endParaRPr lang="en-US" dirty="0"/>
           </a:p>
@@ -4240,7 +4238,7 @@
             <a:fld id="{B4008EB6-D09E-4580-8CD6-DDB14511944F}" type="slidenum">
               <a:rPr lang="en-US" smtClean="0"/>
               <a:pPr/>
-              <a:t>27</a:t>
+              <a:t>26</a:t>
             </a:fld>
             <a:endParaRPr lang="en-US" dirty="0"/>
           </a:p>
@@ -4397,7 +4395,7 @@
           <a:p>
             <a:fld id="{D18B56EA-E28F-4F92-9F16-7A6F2501B303}" type="datetime8">
               <a:rPr lang="en-US" smtClean="0"/>
-              <a:t>3/14/19 5:07 PM</a:t>
+              <a:t>9/1/2019 3:44 PM</a:t>
             </a:fld>
             <a:endParaRPr lang="en-US" dirty="0"/>
           </a:p>
@@ -4421,7 +4419,7 @@
             <a:fld id="{B4008EB6-D09E-4580-8CD6-DDB14511944F}" type="slidenum">
               <a:rPr lang="en-US" smtClean="0"/>
               <a:pPr/>
-              <a:t>28</a:t>
+              <a:t>27</a:t>
             </a:fld>
             <a:endParaRPr lang="en-US" dirty="0"/>
           </a:p>
@@ -4578,7 +4576,7 @@
           <a:p>
             <a:fld id="{D18B56EA-E28F-4F92-9F16-7A6F2501B303}" type="datetime8">
               <a:rPr lang="en-US" smtClean="0"/>
-              <a:t>3/14/19 5:07 PM</a:t>
+              <a:t>9/1/2019 3:44 PM</a:t>
             </a:fld>
             <a:endParaRPr lang="en-US" dirty="0"/>
           </a:p>
@@ -4602,7 +4600,7 @@
             <a:fld id="{B4008EB6-D09E-4580-8CD6-DDB14511944F}" type="slidenum">
               <a:rPr lang="en-US" smtClean="0"/>
               <a:pPr/>
-              <a:t>29</a:t>
+              <a:t>28</a:t>
             </a:fld>
             <a:endParaRPr lang="en-US" dirty="0"/>
           </a:p>
@@ -20910,7 +20908,7 @@
           <p:cNvPr id="2" name="Text Placeholder 1">
             <a:extLst>
               <a:ext uri="{FF2B5EF4-FFF2-40B4-BE49-F238E27FC236}">
-                <a16:creationId xmlns:a16="http://schemas.microsoft.com/office/drawing/2014/main" id="{1997E47A-E57D-3B49-97A1-CA8ABE9A95DF}"/>
+                <a16:creationId xmlns:a16="http://schemas.microsoft.com/office/drawing/2014/main" id="{216D727B-B305-AB41-8E9A-B332F9187821}"/>
               </a:ext>
             </a:extLst>
           </p:cNvPr>
@@ -20924,7 +20922,7 @@
         <p:spPr>
           <a:xfrm>
             <a:off x="464400" y="1212850"/>
-            <a:ext cx="11574000" cy="5555367"/>
+            <a:ext cx="11574000" cy="6204776"/>
           </a:xfrm>
         </p:spPr>
         <p:txBody>
@@ -20933,65 +20931,22 @@
           <a:p>
             <a:r>
               <a:rPr lang="en-US" dirty="0"/>
-              <a:t>SharePoint Framework projects include a special NPM package of Office UI Fabric Core for SharePoint</a:t>
-            </a:r>
-          </a:p>
-          <a:p>
-            <a:pPr lvl="1"/>
-            <a:r>
-              <a:rPr lang="en-US" dirty="0"/>
-              <a:t>Fabric React already includes the Office UI Fabric CSS so… remove the duplicate</a:t>
-            </a:r>
-          </a:p>
-          <a:p>
-            <a:pPr lvl="1"/>
+              <a:t>Don’t import the entire Fabric React library; only import the control:</a:t>
+            </a:r>
+          </a:p>
+          <a:p>
             <a:endParaRPr lang="en-US" dirty="0"/>
           </a:p>
           <a:p>
-            <a:pPr marL="228600" lvl="1" indent="0">
+            <a:pPr marL="0" indent="0">
               <a:buNone/>
             </a:pPr>
-            <a:r>
-              <a:rPr lang="en-US" dirty="0" err="1">
-                <a:latin typeface="Courier New" panose="02070309020205020404" pitchFamily="49" charset="0"/>
-                <a:cs typeface="Courier New" panose="02070309020205020404" pitchFamily="49" charset="0"/>
-              </a:rPr>
-              <a:t>npm</a:t>
-            </a:r>
             <a:r>
               <a:rPr lang="en-US" dirty="0">
                 <a:latin typeface="Courier New" panose="02070309020205020404" pitchFamily="49" charset="0"/>
                 <a:cs typeface="Courier New" panose="02070309020205020404" pitchFamily="49" charset="0"/>
               </a:rPr>
-              <a:t> uninstall @</a:t>
-            </a:r>
-            <a:r>
-              <a:rPr lang="en-US" dirty="0" err="1">
-                <a:latin typeface="Courier New" panose="02070309020205020404" pitchFamily="49" charset="0"/>
-                <a:cs typeface="Courier New" panose="02070309020205020404" pitchFamily="49" charset="0"/>
-              </a:rPr>
-              <a:t>microsoft</a:t>
-            </a:r>
-            <a:r>
-              <a:rPr lang="en-US" dirty="0">
-                <a:latin typeface="Courier New" panose="02070309020205020404" pitchFamily="49" charset="0"/>
-                <a:cs typeface="Courier New" panose="02070309020205020404" pitchFamily="49" charset="0"/>
-              </a:rPr>
-              <a:t>/</a:t>
-            </a:r>
-            <a:r>
-              <a:rPr lang="en-US" dirty="0" err="1">
-                <a:latin typeface="Courier New" panose="02070309020205020404" pitchFamily="49" charset="0"/>
-                <a:cs typeface="Courier New" panose="02070309020205020404" pitchFamily="49" charset="0"/>
-              </a:rPr>
-              <a:t>sp</a:t>
-            </a:r>
-            <a:r>
-              <a:rPr lang="en-US" dirty="0">
-                <a:latin typeface="Courier New" panose="02070309020205020404" pitchFamily="49" charset="0"/>
-                <a:cs typeface="Courier New" panose="02070309020205020404" pitchFamily="49" charset="0"/>
-              </a:rPr>
-              <a:t>-office-</a:t>
+              <a:t>import { List } from 'office-</a:t>
             </a:r>
             <a:r>
               <a:rPr lang="en-US" dirty="0" err="1">
@@ -21005,7 +20960,7 @@
                 <a:latin typeface="Courier New" panose="02070309020205020404" pitchFamily="49" charset="0"/>
                 <a:cs typeface="Courier New" panose="02070309020205020404" pitchFamily="49" charset="0"/>
               </a:rPr>
-              <a:t>-fabric-core --save</a:t>
+              <a:t>-fabric-react/lib/List’;</a:t>
             </a:r>
           </a:p>
           <a:p>
@@ -21014,33 +20969,14 @@
           <a:p>
             <a:r>
               <a:rPr lang="en-US" dirty="0"/>
-              <a:t>Update included web part’s reference to Office UI Fabric CSS</a:t>
-            </a:r>
-          </a:p>
-          <a:p>
-            <a:pPr lvl="1"/>
-            <a:r>
-              <a:rPr lang="en-US" dirty="0"/>
-              <a:t>Remove old reference to the Office UI Fabric Core CSS</a:t>
-            </a:r>
-          </a:p>
-          <a:p>
-            <a:pPr lvl="1"/>
+              <a:t>Leverage the control within your React control:</a:t>
+            </a:r>
+          </a:p>
+          <a:p>
             <a:endParaRPr lang="en-US" dirty="0"/>
           </a:p>
           <a:p>
-            <a:pPr lvl="1"/>
-            <a:r>
-              <a:rPr lang="en-US" dirty="0"/>
-              <a:t>Change the first line in the web part’s SCSS from:</a:t>
-            </a:r>
-          </a:p>
-          <a:p>
-            <a:pPr lvl="2"/>
-            <a:endParaRPr lang="en-US" dirty="0"/>
-          </a:p>
-          <a:p>
-            <a:pPr marL="457200" lvl="2" indent="0">
+            <a:pPr marL="0" indent="0">
               <a:buNone/>
             </a:pPr>
             <a:r>
@@ -21048,96 +20984,129 @@
                 <a:latin typeface="Courier New" panose="02070309020205020404" pitchFamily="49" charset="0"/>
                 <a:cs typeface="Courier New" panose="02070309020205020404" pitchFamily="49" charset="0"/>
               </a:rPr>
-              <a:t>@import '~@</a:t>
+              <a:t>public render(): </a:t>
             </a:r>
             <a:r>
               <a:rPr lang="en-US" dirty="0" err="1">
                 <a:latin typeface="Courier New" panose="02070309020205020404" pitchFamily="49" charset="0"/>
                 <a:cs typeface="Courier New" panose="02070309020205020404" pitchFamily="49" charset="0"/>
               </a:rPr>
-              <a:t>microsoft</a:t>
+              <a:t>React.ReactElement</a:t>
             </a:r>
             <a:r>
               <a:rPr lang="en-US" dirty="0">
                 <a:latin typeface="Courier New" panose="02070309020205020404" pitchFamily="49" charset="0"/>
                 <a:cs typeface="Courier New" panose="02070309020205020404" pitchFamily="49" charset="0"/>
               </a:rPr>
-              <a:t>/</a:t>
+              <a:t>&lt;</a:t>
             </a:r>
             <a:r>
               <a:rPr lang="en-US" dirty="0" err="1">
                 <a:latin typeface="Courier New" panose="02070309020205020404" pitchFamily="49" charset="0"/>
                 <a:cs typeface="Courier New" panose="02070309020205020404" pitchFamily="49" charset="0"/>
               </a:rPr>
-              <a:t>sp</a:t>
+              <a:t>IColorListProps</a:t>
             </a:r>
             <a:r>
               <a:rPr lang="en-US" dirty="0">
                 <a:latin typeface="Courier New" panose="02070309020205020404" pitchFamily="49" charset="0"/>
                 <a:cs typeface="Courier New" panose="02070309020205020404" pitchFamily="49" charset="0"/>
               </a:rPr>
-              <a:t>-office-</a:t>
+              <a:t>&gt; {</a:t>
+            </a:r>
+          </a:p>
+          <a:p>
+            <a:pPr marL="0" indent="0">
+              <a:buNone/>
+            </a:pPr>
+            <a:r>
+              <a:rPr lang="en-US" dirty="0">
+                <a:latin typeface="Courier New" panose="02070309020205020404" pitchFamily="49" charset="0"/>
+                <a:cs typeface="Courier New" panose="02070309020205020404" pitchFamily="49" charset="0"/>
+              </a:rPr>
+              <a:t>  return (</a:t>
+            </a:r>
+          </a:p>
+          <a:p>
+            <a:pPr marL="0" indent="0">
+              <a:buNone/>
+            </a:pPr>
+            <a:r>
+              <a:rPr lang="en-US" dirty="0">
+                <a:latin typeface="Courier New" panose="02070309020205020404" pitchFamily="49" charset="0"/>
+                <a:cs typeface="Courier New" panose="02070309020205020404" pitchFamily="49" charset="0"/>
+              </a:rPr>
+              <a:t>    &lt;div&gt;</a:t>
+            </a:r>
+          </a:p>
+          <a:p>
+            <a:pPr marL="0" indent="0">
+              <a:buNone/>
+            </a:pPr>
+            <a:r>
+              <a:rPr lang="en-US" dirty="0">
+                <a:latin typeface="Courier New" panose="02070309020205020404" pitchFamily="49" charset="0"/>
+                <a:cs typeface="Courier New" panose="02070309020205020404" pitchFamily="49" charset="0"/>
+              </a:rPr>
+              <a:t>      &lt;List items={ </a:t>
             </a:r>
             <a:r>
               <a:rPr lang="en-US" dirty="0" err="1">
                 <a:latin typeface="Courier New" panose="02070309020205020404" pitchFamily="49" charset="0"/>
                 <a:cs typeface="Courier New" panose="02070309020205020404" pitchFamily="49" charset="0"/>
               </a:rPr>
-              <a:t>ui</a:t>
+              <a:t>this.props.colors</a:t>
             </a:r>
             <a:r>
               <a:rPr lang="en-US" dirty="0">
                 <a:latin typeface="Courier New" panose="02070309020205020404" pitchFamily="49" charset="0"/>
                 <a:cs typeface="Courier New" panose="02070309020205020404" pitchFamily="49" charset="0"/>
               </a:rPr>
-              <a:t>-fabric-core/</a:t>
+              <a:t> } </a:t>
+            </a:r>
+          </a:p>
+          <a:p>
+            <a:pPr marL="0" indent="0">
+              <a:buNone/>
+            </a:pPr>
+            <a:r>
+              <a:rPr lang="en-US" dirty="0">
+                <a:latin typeface="Courier New" panose="02070309020205020404" pitchFamily="49" charset="0"/>
+                <a:cs typeface="Courier New" panose="02070309020205020404" pitchFamily="49" charset="0"/>
+              </a:rPr>
+              <a:t>            </a:t>
             </a:r>
             <a:r>
               <a:rPr lang="en-US" dirty="0" err="1">
                 <a:latin typeface="Courier New" panose="02070309020205020404" pitchFamily="49" charset="0"/>
                 <a:cs typeface="Courier New" panose="02070309020205020404" pitchFamily="49" charset="0"/>
               </a:rPr>
-              <a:t>dist</a:t>
+              <a:t>onRenderCell</a:t>
             </a:r>
             <a:r>
               <a:rPr lang="en-US" dirty="0">
                 <a:latin typeface="Courier New" panose="02070309020205020404" pitchFamily="49" charset="0"/>
                 <a:cs typeface="Courier New" panose="02070309020205020404" pitchFamily="49" charset="0"/>
               </a:rPr>
-              <a:t>/sass/</a:t>
+              <a:t>={ this._</a:t>
             </a:r>
             <a:r>
               <a:rPr lang="en-US" dirty="0" err="1">
                 <a:latin typeface="Courier New" panose="02070309020205020404" pitchFamily="49" charset="0"/>
                 <a:cs typeface="Courier New" panose="02070309020205020404" pitchFamily="49" charset="0"/>
               </a:rPr>
-              <a:t>SPFabricCore.scss</a:t>
+              <a:t>onRenderListCell</a:t>
             </a:r>
             <a:r>
               <a:rPr lang="en-US" dirty="0">
                 <a:latin typeface="Courier New" panose="02070309020205020404" pitchFamily="49" charset="0"/>
                 <a:cs typeface="Courier New" panose="02070309020205020404" pitchFamily="49" charset="0"/>
               </a:rPr>
-              <a:t>’;</a:t>
-            </a:r>
-          </a:p>
-          <a:p>
-            <a:pPr lvl="1"/>
-            <a:endParaRPr lang="en-US" dirty="0"/>
-          </a:p>
-          <a:p>
-            <a:pPr lvl="1"/>
-            <a:r>
-              <a:rPr lang="en-US" dirty="0"/>
-              <a:t>…and replace it with the following:</a:t>
-            </a:r>
-          </a:p>
-          <a:p>
-            <a:pPr lvl="1"/>
-            <a:endParaRPr lang="en-US" dirty="0"/>
-          </a:p>
-          <a:p>
-            <a:pPr marL="228600" lvl="1" indent="0">
+              <a:t> } /&gt;</a:t>
+            </a:r>
+          </a:p>
+          <a:p>
+            <a:pPr marL="0" indent="0">
               <a:buNone/>
             </a:pPr>
             <a:r>
@@ -21145,53 +21114,34 @@
                 <a:latin typeface="Courier New" panose="02070309020205020404" pitchFamily="49" charset="0"/>
                 <a:cs typeface="Courier New" panose="02070309020205020404" pitchFamily="49" charset="0"/>
               </a:rPr>
-              <a:t>@import '~office-</a:t>
-            </a:r>
-            <a:r>
-              <a:rPr lang="en-US" dirty="0" err="1">
-                <a:latin typeface="Courier New" panose="02070309020205020404" pitchFamily="49" charset="0"/>
-                <a:cs typeface="Courier New" panose="02070309020205020404" pitchFamily="49" charset="0"/>
-              </a:rPr>
-              <a:t>ui</a:t>
-            </a:r>
+              <a:t>    &lt;/div&gt;</a:t>
+            </a:r>
+          </a:p>
+          <a:p>
+            <a:pPr marL="0" indent="0">
+              <a:buNone/>
+            </a:pPr>
             <a:r>
               <a:rPr lang="en-US" dirty="0">
                 <a:latin typeface="Courier New" panose="02070309020205020404" pitchFamily="49" charset="0"/>
                 <a:cs typeface="Courier New" panose="02070309020205020404" pitchFamily="49" charset="0"/>
               </a:rPr>
-              <a:t>-fabric-react/</a:t>
-            </a:r>
-            <a:r>
-              <a:rPr lang="en-US" dirty="0" err="1">
-                <a:latin typeface="Courier New" panose="02070309020205020404" pitchFamily="49" charset="0"/>
-                <a:cs typeface="Courier New" panose="02070309020205020404" pitchFamily="49" charset="0"/>
-              </a:rPr>
-              <a:t>dist</a:t>
-            </a:r>
+              <a:t>  );</a:t>
+            </a:r>
+          </a:p>
+          <a:p>
+            <a:pPr marL="0" indent="0">
+              <a:buNone/>
+            </a:pPr>
             <a:r>
               <a:rPr lang="en-US" dirty="0">
                 <a:latin typeface="Courier New" panose="02070309020205020404" pitchFamily="49" charset="0"/>
                 <a:cs typeface="Courier New" panose="02070309020205020404" pitchFamily="49" charset="0"/>
               </a:rPr>
-              <a:t>/sass/_</a:t>
-            </a:r>
-            <a:r>
-              <a:rPr lang="en-US" dirty="0" err="1">
-                <a:latin typeface="Courier New" panose="02070309020205020404" pitchFamily="49" charset="0"/>
-                <a:cs typeface="Courier New" panose="02070309020205020404" pitchFamily="49" charset="0"/>
-              </a:rPr>
-              <a:t>References.scss</a:t>
-            </a:r>
-            <a:r>
-              <a:rPr lang="en-US" dirty="0">
-                <a:latin typeface="Courier New" panose="02070309020205020404" pitchFamily="49" charset="0"/>
-                <a:cs typeface="Courier New" panose="02070309020205020404" pitchFamily="49" charset="0"/>
-              </a:rPr>
-              <a:t>';</a:t>
-            </a:r>
-          </a:p>
-          <a:p>
-            <a:pPr lvl="1"/>
+              <a:t>}</a:t>
+            </a:r>
+          </a:p>
+          <a:p>
             <a:endParaRPr lang="en-US" dirty="0"/>
           </a:p>
         </p:txBody>
@@ -21201,7 +21151,7 @@
           <p:cNvPr id="3" name="Title 2">
             <a:extLst>
               <a:ext uri="{FF2B5EF4-FFF2-40B4-BE49-F238E27FC236}">
-                <a16:creationId xmlns:a16="http://schemas.microsoft.com/office/drawing/2014/main" id="{188416AF-0369-5741-8E16-16C3AC0C24F4}"/>
+                <a16:creationId xmlns:a16="http://schemas.microsoft.com/office/drawing/2014/main" id="{D1463138-5F78-7948-B845-50FB804ADEE4}"/>
               </a:ext>
             </a:extLst>
           </p:cNvPr>
@@ -21224,15 +21174,7 @@
           <a:p>
             <a:r>
               <a:rPr lang="en-US" dirty="0"/>
-              <a:t>Adding Fabric React to </a:t>
-            </a:r>
-            <a:r>
-              <a:rPr lang="en-US" dirty="0" err="1"/>
-              <a:t>SPFx</a:t>
-            </a:r>
-            <a:r>
-              <a:rPr lang="en-US" dirty="0"/>
-              <a:t> Projects</a:t>
+              <a:t>Using Fabric React Controls</a:t>
             </a:r>
           </a:p>
         </p:txBody>
@@ -21240,7 +21182,7 @@
     </p:spTree>
     <p:extLst>
       <p:ext uri="{BB962C8B-B14F-4D97-AF65-F5344CB8AC3E}">
-        <p14:creationId xmlns:p14="http://schemas.microsoft.com/office/powerpoint/2010/main" val="1170000069"/>
+        <p14:creationId xmlns:p14="http://schemas.microsoft.com/office/powerpoint/2010/main" val="2181904387"/>
       </p:ext>
     </p:extLst>
   </p:cSld>
@@ -21272,315 +21214,6 @@
       </p:grpSpPr>
       <p:sp>
         <p:nvSpPr>
-          <p:cNvPr id="2" name="Text Placeholder 1">
-            <a:extLst>
-              <a:ext uri="{FF2B5EF4-FFF2-40B4-BE49-F238E27FC236}">
-                <a16:creationId xmlns:a16="http://schemas.microsoft.com/office/drawing/2014/main" id="{216D727B-B305-AB41-8E9A-B332F9187821}"/>
-              </a:ext>
-            </a:extLst>
-          </p:cNvPr>
-          <p:cNvSpPr>
-            <a:spLocks noGrp="1"/>
-          </p:cNvSpPr>
-          <p:nvPr>
-            <p:ph type="body" sz="quarter" idx="10"/>
-          </p:nvPr>
-        </p:nvSpPr>
-        <p:spPr>
-          <a:xfrm>
-            <a:off x="464400" y="1212850"/>
-            <a:ext cx="11574000" cy="6204776"/>
-          </a:xfrm>
-        </p:spPr>
-        <p:txBody>
-          <a:bodyPr/>
-          <a:lstStyle/>
-          <a:p>
-            <a:r>
-              <a:rPr lang="en-US" dirty="0"/>
-              <a:t>Don’t import the entire Fabric React library; only import the control:</a:t>
-            </a:r>
-          </a:p>
-          <a:p>
-            <a:endParaRPr lang="en-US" dirty="0"/>
-          </a:p>
-          <a:p>
-            <a:pPr marL="0" indent="0">
-              <a:buNone/>
-            </a:pPr>
-            <a:r>
-              <a:rPr lang="en-US" dirty="0">
-                <a:latin typeface="Courier New" panose="02070309020205020404" pitchFamily="49" charset="0"/>
-                <a:cs typeface="Courier New" panose="02070309020205020404" pitchFamily="49" charset="0"/>
-              </a:rPr>
-              <a:t>import { List } from 'office-</a:t>
-            </a:r>
-            <a:r>
-              <a:rPr lang="en-US" dirty="0" err="1">
-                <a:latin typeface="Courier New" panose="02070309020205020404" pitchFamily="49" charset="0"/>
-                <a:cs typeface="Courier New" panose="02070309020205020404" pitchFamily="49" charset="0"/>
-              </a:rPr>
-              <a:t>ui</a:t>
-            </a:r>
-            <a:r>
-              <a:rPr lang="en-US" dirty="0">
-                <a:latin typeface="Courier New" panose="02070309020205020404" pitchFamily="49" charset="0"/>
-                <a:cs typeface="Courier New" panose="02070309020205020404" pitchFamily="49" charset="0"/>
-              </a:rPr>
-              <a:t>-fabric-react/lib/List’;</a:t>
-            </a:r>
-          </a:p>
-          <a:p>
-            <a:endParaRPr lang="en-US" dirty="0"/>
-          </a:p>
-          <a:p>
-            <a:r>
-              <a:rPr lang="en-US" dirty="0"/>
-              <a:t>Leverage the control within your React control:</a:t>
-            </a:r>
-          </a:p>
-          <a:p>
-            <a:endParaRPr lang="en-US" dirty="0"/>
-          </a:p>
-          <a:p>
-            <a:pPr marL="0" indent="0">
-              <a:buNone/>
-            </a:pPr>
-            <a:r>
-              <a:rPr lang="en-US" dirty="0">
-                <a:latin typeface="Courier New" panose="02070309020205020404" pitchFamily="49" charset="0"/>
-                <a:cs typeface="Courier New" panose="02070309020205020404" pitchFamily="49" charset="0"/>
-              </a:rPr>
-              <a:t>public render(): </a:t>
-            </a:r>
-            <a:r>
-              <a:rPr lang="en-US" dirty="0" err="1">
-                <a:latin typeface="Courier New" panose="02070309020205020404" pitchFamily="49" charset="0"/>
-                <a:cs typeface="Courier New" panose="02070309020205020404" pitchFamily="49" charset="0"/>
-              </a:rPr>
-              <a:t>React.ReactElement</a:t>
-            </a:r>
-            <a:r>
-              <a:rPr lang="en-US" dirty="0">
-                <a:latin typeface="Courier New" panose="02070309020205020404" pitchFamily="49" charset="0"/>
-                <a:cs typeface="Courier New" panose="02070309020205020404" pitchFamily="49" charset="0"/>
-              </a:rPr>
-              <a:t>&lt;</a:t>
-            </a:r>
-            <a:r>
-              <a:rPr lang="en-US" dirty="0" err="1">
-                <a:latin typeface="Courier New" panose="02070309020205020404" pitchFamily="49" charset="0"/>
-                <a:cs typeface="Courier New" panose="02070309020205020404" pitchFamily="49" charset="0"/>
-              </a:rPr>
-              <a:t>IColorListProps</a:t>
-            </a:r>
-            <a:r>
-              <a:rPr lang="en-US" dirty="0">
-                <a:latin typeface="Courier New" panose="02070309020205020404" pitchFamily="49" charset="0"/>
-                <a:cs typeface="Courier New" panose="02070309020205020404" pitchFamily="49" charset="0"/>
-              </a:rPr>
-              <a:t>&gt; {</a:t>
-            </a:r>
-          </a:p>
-          <a:p>
-            <a:pPr marL="0" indent="0">
-              <a:buNone/>
-            </a:pPr>
-            <a:r>
-              <a:rPr lang="en-US" dirty="0">
-                <a:latin typeface="Courier New" panose="02070309020205020404" pitchFamily="49" charset="0"/>
-                <a:cs typeface="Courier New" panose="02070309020205020404" pitchFamily="49" charset="0"/>
-              </a:rPr>
-              <a:t>  return (</a:t>
-            </a:r>
-          </a:p>
-          <a:p>
-            <a:pPr marL="0" indent="0">
-              <a:buNone/>
-            </a:pPr>
-            <a:r>
-              <a:rPr lang="en-US" dirty="0">
-                <a:latin typeface="Courier New" panose="02070309020205020404" pitchFamily="49" charset="0"/>
-                <a:cs typeface="Courier New" panose="02070309020205020404" pitchFamily="49" charset="0"/>
-              </a:rPr>
-              <a:t>    &lt;div&gt;</a:t>
-            </a:r>
-          </a:p>
-          <a:p>
-            <a:pPr marL="0" indent="0">
-              <a:buNone/>
-            </a:pPr>
-            <a:r>
-              <a:rPr lang="en-US" dirty="0">
-                <a:latin typeface="Courier New" panose="02070309020205020404" pitchFamily="49" charset="0"/>
-                <a:cs typeface="Courier New" panose="02070309020205020404" pitchFamily="49" charset="0"/>
-              </a:rPr>
-              <a:t>      &lt;List items={ </a:t>
-            </a:r>
-            <a:r>
-              <a:rPr lang="en-US" dirty="0" err="1">
-                <a:latin typeface="Courier New" panose="02070309020205020404" pitchFamily="49" charset="0"/>
-                <a:cs typeface="Courier New" panose="02070309020205020404" pitchFamily="49" charset="0"/>
-              </a:rPr>
-              <a:t>this.props.colors</a:t>
-            </a:r>
-            <a:r>
-              <a:rPr lang="en-US" dirty="0">
-                <a:latin typeface="Courier New" panose="02070309020205020404" pitchFamily="49" charset="0"/>
-                <a:cs typeface="Courier New" panose="02070309020205020404" pitchFamily="49" charset="0"/>
-              </a:rPr>
-              <a:t> } </a:t>
-            </a:r>
-          </a:p>
-          <a:p>
-            <a:pPr marL="0" indent="0">
-              <a:buNone/>
-            </a:pPr>
-            <a:r>
-              <a:rPr lang="en-US" dirty="0">
-                <a:latin typeface="Courier New" panose="02070309020205020404" pitchFamily="49" charset="0"/>
-                <a:cs typeface="Courier New" panose="02070309020205020404" pitchFamily="49" charset="0"/>
-              </a:rPr>
-              <a:t>            </a:t>
-            </a:r>
-            <a:r>
-              <a:rPr lang="en-US" dirty="0" err="1">
-                <a:latin typeface="Courier New" panose="02070309020205020404" pitchFamily="49" charset="0"/>
-                <a:cs typeface="Courier New" panose="02070309020205020404" pitchFamily="49" charset="0"/>
-              </a:rPr>
-              <a:t>onRenderCell</a:t>
-            </a:r>
-            <a:r>
-              <a:rPr lang="en-US" dirty="0">
-                <a:latin typeface="Courier New" panose="02070309020205020404" pitchFamily="49" charset="0"/>
-                <a:cs typeface="Courier New" panose="02070309020205020404" pitchFamily="49" charset="0"/>
-              </a:rPr>
-              <a:t>={ this._</a:t>
-            </a:r>
-            <a:r>
-              <a:rPr lang="en-US" dirty="0" err="1">
-                <a:latin typeface="Courier New" panose="02070309020205020404" pitchFamily="49" charset="0"/>
-                <a:cs typeface="Courier New" panose="02070309020205020404" pitchFamily="49" charset="0"/>
-              </a:rPr>
-              <a:t>onRenderListCell</a:t>
-            </a:r>
-            <a:r>
-              <a:rPr lang="en-US" dirty="0">
-                <a:latin typeface="Courier New" panose="02070309020205020404" pitchFamily="49" charset="0"/>
-                <a:cs typeface="Courier New" panose="02070309020205020404" pitchFamily="49" charset="0"/>
-              </a:rPr>
-              <a:t> } /&gt;</a:t>
-            </a:r>
-          </a:p>
-          <a:p>
-            <a:pPr marL="0" indent="0">
-              <a:buNone/>
-            </a:pPr>
-            <a:r>
-              <a:rPr lang="en-US" dirty="0">
-                <a:latin typeface="Courier New" panose="02070309020205020404" pitchFamily="49" charset="0"/>
-                <a:cs typeface="Courier New" panose="02070309020205020404" pitchFamily="49" charset="0"/>
-              </a:rPr>
-              <a:t>    &lt;/div&gt;</a:t>
-            </a:r>
-          </a:p>
-          <a:p>
-            <a:pPr marL="0" indent="0">
-              <a:buNone/>
-            </a:pPr>
-            <a:r>
-              <a:rPr lang="en-US" dirty="0">
-                <a:latin typeface="Courier New" panose="02070309020205020404" pitchFamily="49" charset="0"/>
-                <a:cs typeface="Courier New" panose="02070309020205020404" pitchFamily="49" charset="0"/>
-              </a:rPr>
-              <a:t>  );</a:t>
-            </a:r>
-          </a:p>
-          <a:p>
-            <a:pPr marL="0" indent="0">
-              <a:buNone/>
-            </a:pPr>
-            <a:r>
-              <a:rPr lang="en-US" dirty="0">
-                <a:latin typeface="Courier New" panose="02070309020205020404" pitchFamily="49" charset="0"/>
-                <a:cs typeface="Courier New" panose="02070309020205020404" pitchFamily="49" charset="0"/>
-              </a:rPr>
-              <a:t>}</a:t>
-            </a:r>
-          </a:p>
-          <a:p>
-            <a:endParaRPr lang="en-US" dirty="0"/>
-          </a:p>
-        </p:txBody>
-      </p:sp>
-      <p:sp>
-        <p:nvSpPr>
-          <p:cNvPr id="3" name="Title 2">
-            <a:extLst>
-              <a:ext uri="{FF2B5EF4-FFF2-40B4-BE49-F238E27FC236}">
-                <a16:creationId xmlns:a16="http://schemas.microsoft.com/office/drawing/2014/main" id="{D1463138-5F78-7948-B845-50FB804ADEE4}"/>
-              </a:ext>
-            </a:extLst>
-          </p:cNvPr>
-          <p:cNvSpPr>
-            <a:spLocks noGrp="1"/>
-          </p:cNvSpPr>
-          <p:nvPr>
-            <p:ph type="title"/>
-          </p:nvPr>
-        </p:nvSpPr>
-        <p:spPr>
-          <a:xfrm>
-            <a:off x="464400" y="633600"/>
-            <a:ext cx="11574000" cy="387798"/>
-          </a:xfrm>
-        </p:spPr>
-        <p:txBody>
-          <a:bodyPr/>
-          <a:lstStyle/>
-          <a:p>
-            <a:r>
-              <a:rPr lang="en-US" dirty="0"/>
-              <a:t>Using Fabric React Controls</a:t>
-            </a:r>
-          </a:p>
-        </p:txBody>
-      </p:sp>
-    </p:spTree>
-    <p:extLst>
-      <p:ext uri="{BB962C8B-B14F-4D97-AF65-F5344CB8AC3E}">
-        <p14:creationId xmlns:p14="http://schemas.microsoft.com/office/powerpoint/2010/main" val="2181904387"/>
-      </p:ext>
-    </p:extLst>
-  </p:cSld>
-  <p:clrMapOvr>
-    <a:masterClrMapping/>
-  </p:clrMapOvr>
-  <p:transition>
-    <p:fade/>
-  </p:transition>
-</p:sld>
-</file>
-
-<file path=ppt/slides/slide25.xml><?xml version="1.0" encoding="utf-8"?>
-<p:sld xmlns:a="http://schemas.openxmlformats.org/drawingml/2006/main" xmlns:r="http://schemas.openxmlformats.org/officeDocument/2006/relationships" xmlns:p="http://schemas.openxmlformats.org/presentationml/2006/main">
-  <p:cSld>
-    <p:spTree>
-      <p:nvGrpSpPr>
-        <p:cNvPr id="1" name=""/>
-        <p:cNvGrpSpPr/>
-        <p:nvPr/>
-      </p:nvGrpSpPr>
-      <p:grpSpPr>
-        <a:xfrm>
-          <a:off x="0" y="0"/>
-          <a:ext cx="0" cy="0"/>
-          <a:chOff x="0" y="0"/>
-          <a:chExt cx="0" cy="0"/>
-        </a:xfrm>
-      </p:grpSpPr>
-      <p:sp>
-        <p:nvSpPr>
           <p:cNvPr id="2" name="Title 1"/>
           <p:cNvSpPr>
             <a:spLocks noGrp="1"/>
@@ -21633,7 +21266,7 @@
 </p:sld>
 </file>
 
-<file path=ppt/slides/slide26.xml><?xml version="1.0" encoding="utf-8"?>
+<file path=ppt/slides/slide25.xml><?xml version="1.0" encoding="utf-8"?>
 <p:sld xmlns:a="http://schemas.openxmlformats.org/drawingml/2006/main" xmlns:r="http://schemas.openxmlformats.org/officeDocument/2006/relationships" xmlns:p="http://schemas.openxmlformats.org/presentationml/2006/main">
   <p:cSld>
     <p:spTree>
@@ -22142,7 +21775,7 @@
 </p:sld>
 </file>
 
-<file path=ppt/slides/slide27.xml><?xml version="1.0" encoding="utf-8"?>
+<file path=ppt/slides/slide26.xml><?xml version="1.0" encoding="utf-8"?>
 <p:sld xmlns:a="http://schemas.openxmlformats.org/drawingml/2006/main" xmlns:r="http://schemas.openxmlformats.org/officeDocument/2006/relationships" xmlns:p="http://schemas.openxmlformats.org/presentationml/2006/main">
   <p:cSld>
     <p:spTree>
@@ -22407,7 +22040,7 @@
 </p:sld>
 </file>
 
-<file path=ppt/slides/slide28.xml><?xml version="1.0" encoding="utf-8"?>
+<file path=ppt/slides/slide27.xml><?xml version="1.0" encoding="utf-8"?>
 <p:sld xmlns:a="http://schemas.openxmlformats.org/drawingml/2006/main" xmlns:r="http://schemas.openxmlformats.org/officeDocument/2006/relationships" xmlns:p="http://schemas.openxmlformats.org/presentationml/2006/main">
   <p:cSld>
     <p:spTree>
@@ -22471,7 +22104,7 @@
 </p:sld>
 </file>
 
-<file path=ppt/slides/slide29.xml><?xml version="1.0" encoding="utf-8"?>
+<file path=ppt/slides/slide28.xml><?xml version="1.0" encoding="utf-8"?>
 <p:sld xmlns:a="http://schemas.openxmlformats.org/drawingml/2006/main" xmlns:r="http://schemas.openxmlformats.org/officeDocument/2006/relationships" xmlns:p="http://schemas.openxmlformats.org/presentationml/2006/main">
   <p:cSld>
     <p:spTree>

</xml_diff>